<commit_message>
deleted one useless page
</commit_message>
<xml_diff>
--- a/presentation.pptx
+++ b/presentation.pptx
@@ -5,7 +5,7 @@
     <p:sldMasterId id="2147483660" r:id="rId1"/>
   </p:sldMasterIdLst>
   <p:notesMasterIdLst>
-    <p:notesMasterId r:id="rId28"/>
+    <p:notesMasterId r:id="rId27"/>
   </p:notesMasterIdLst>
   <p:sldIdLst>
     <p:sldId id="256" r:id="rId2"/>
@@ -27,13 +27,12 @@
     <p:sldId id="274" r:id="rId18"/>
     <p:sldId id="276" r:id="rId19"/>
     <p:sldId id="275" r:id="rId20"/>
-    <p:sldId id="277" r:id="rId21"/>
-    <p:sldId id="278" r:id="rId22"/>
-    <p:sldId id="279" r:id="rId23"/>
-    <p:sldId id="280" r:id="rId24"/>
-    <p:sldId id="281" r:id="rId25"/>
-    <p:sldId id="282" r:id="rId26"/>
-    <p:sldId id="284" r:id="rId27"/>
+    <p:sldId id="278" r:id="rId21"/>
+    <p:sldId id="279" r:id="rId22"/>
+    <p:sldId id="280" r:id="rId23"/>
+    <p:sldId id="281" r:id="rId24"/>
+    <p:sldId id="282" r:id="rId25"/>
+    <p:sldId id="284" r:id="rId26"/>
   </p:sldIdLst>
   <p:sldSz cx="12192000" cy="6858000"/>
   <p:notesSz cx="6858000" cy="9144000"/>
@@ -138,6 +137,10 @@
     </p:ext>
   </p:extLst>
 </p:presentation>
+</file>
+
+<file path=ppt/revisionInfo.xml><?xml version="1.0" encoding="utf-8"?>
+<p1510:revInfo xmlns:a="http://schemas.openxmlformats.org/drawingml/2006/main" xmlns:r="http://schemas.openxmlformats.org/officeDocument/2006/relationships" xmlns:p1510="http://schemas.microsoft.com/office/powerpoint/2015/10/main"/>
 </file>
 
 <file path=ppt/notesMasters/notesMaster1.xml><?xml version="1.0" encoding="utf-8"?>
@@ -1188,6 +1191,37 @@
           <a:bodyPr/>
           <a:lstStyle/>
           <a:p>
+            <a:pPr marL="0" marR="0" indent="0" algn="l" defTabSz="914400" rtl="0" eaLnBrk="1" fontAlgn="auto" latinLnBrk="0" hangingPunct="1">
+              <a:lnSpc>
+                <a:spcPct val="100000"/>
+              </a:lnSpc>
+              <a:spcBef>
+                <a:spcPts val="0"/>
+              </a:spcBef>
+              <a:spcAft>
+                <a:spcPts val="0"/>
+              </a:spcAft>
+              <a:buClrTx/>
+              <a:buSzTx/>
+              <a:buFontTx/>
+              <a:buNone/>
+              <a:tabLst/>
+              <a:defRPr/>
+            </a:pPr>
+            <a:r>
+              <a:rPr lang="en-CA" dirty="0"/>
+              <a:t>We see that the best learning rate for these 15 explanatory </a:t>
+            </a:r>
+            <a:r>
+              <a:rPr lang="en-CA" dirty="0" err="1"/>
+              <a:t>variates</a:t>
+            </a:r>
+            <a:r>
+              <a:rPr lang="en-CA" dirty="0"/>
+              <a:t> is at around 0.06 – 0.08, with cv error around 1.66.</a:t>
+            </a:r>
+          </a:p>
+          <a:p>
             <a:endParaRPr lang="en-CA" dirty="0"/>
           </a:p>
         </p:txBody>
@@ -1218,7 +1252,7 @@
     </p:spTree>
     <p:extLst>
       <p:ext uri="{BB962C8B-B14F-4D97-AF65-F5344CB8AC3E}">
-        <p14:creationId xmlns:p14="http://schemas.microsoft.com/office/powerpoint/2010/main" val="3444619015"/>
+        <p14:creationId xmlns:p14="http://schemas.microsoft.com/office/powerpoint/2010/main" val="3925585945"/>
       </p:ext>
     </p:extLst>
   </p:cSld>
@@ -1272,121 +1306,6 @@
           <a:bodyPr/>
           <a:lstStyle/>
           <a:p>
-            <a:pPr marL="0" marR="0" indent="0" algn="l" defTabSz="914400" rtl="0" eaLnBrk="1" fontAlgn="auto" latinLnBrk="0" hangingPunct="1">
-              <a:lnSpc>
-                <a:spcPct val="100000"/>
-              </a:lnSpc>
-              <a:spcBef>
-                <a:spcPts val="0"/>
-              </a:spcBef>
-              <a:spcAft>
-                <a:spcPts val="0"/>
-              </a:spcAft>
-              <a:buClrTx/>
-              <a:buSzTx/>
-              <a:buFontTx/>
-              <a:buNone/>
-              <a:tabLst/>
-              <a:defRPr/>
-            </a:pPr>
-            <a:r>
-              <a:rPr lang="en-CA" dirty="0"/>
-              <a:t>We see that the best learning rate for these 15 explanatory </a:t>
-            </a:r>
-            <a:r>
-              <a:rPr lang="en-CA" dirty="0" err="1"/>
-              <a:t>variates</a:t>
-            </a:r>
-            <a:r>
-              <a:rPr lang="en-CA" dirty="0"/>
-              <a:t> is at around 0.06 – 0.08, with cv error around 1.66.</a:t>
-            </a:r>
-          </a:p>
-          <a:p>
-            <a:endParaRPr lang="en-CA" dirty="0"/>
-          </a:p>
-        </p:txBody>
-      </p:sp>
-      <p:sp>
-        <p:nvSpPr>
-          <p:cNvPr id="4" name="灯片编号占位符 3"/>
-          <p:cNvSpPr>
-            <a:spLocks noGrp="1"/>
-          </p:cNvSpPr>
-          <p:nvPr>
-            <p:ph type="sldNum" sz="quarter" idx="10"/>
-          </p:nvPr>
-        </p:nvSpPr>
-        <p:spPr/>
-        <p:txBody>
-          <a:bodyPr/>
-          <a:lstStyle/>
-          <a:p>
-            <a:fld id="{7DE8CF1B-47E4-456A-92EC-EAEB81C89AE6}" type="slidenum">
-              <a:rPr lang="en-CA" smtClean="0"/>
-              <a:t>21</a:t>
-            </a:fld>
-            <a:endParaRPr lang="en-CA"/>
-          </a:p>
-        </p:txBody>
-      </p:sp>
-    </p:spTree>
-    <p:extLst>
-      <p:ext uri="{BB962C8B-B14F-4D97-AF65-F5344CB8AC3E}">
-        <p14:creationId xmlns:p14="http://schemas.microsoft.com/office/powerpoint/2010/main" val="3925585945"/>
-      </p:ext>
-    </p:extLst>
-  </p:cSld>
-  <p:clrMapOvr>
-    <a:masterClrMapping/>
-  </p:clrMapOvr>
-</p:notes>
-</file>
-
-<file path=ppt/notesSlides/notesSlide16.xml><?xml version="1.0" encoding="utf-8"?>
-<p:notes xmlns:a="http://schemas.openxmlformats.org/drawingml/2006/main" xmlns:r="http://schemas.openxmlformats.org/officeDocument/2006/relationships" xmlns:p="http://schemas.openxmlformats.org/presentationml/2006/main">
-  <p:cSld>
-    <p:spTree>
-      <p:nvGrpSpPr>
-        <p:cNvPr id="1" name=""/>
-        <p:cNvGrpSpPr/>
-        <p:nvPr/>
-      </p:nvGrpSpPr>
-      <p:grpSpPr>
-        <a:xfrm>
-          <a:off x="0" y="0"/>
-          <a:ext cx="0" cy="0"/>
-          <a:chOff x="0" y="0"/>
-          <a:chExt cx="0" cy="0"/>
-        </a:xfrm>
-      </p:grpSpPr>
-      <p:sp>
-        <p:nvSpPr>
-          <p:cNvPr id="2" name="幻灯片图像占位符 1"/>
-          <p:cNvSpPr>
-            <a:spLocks noGrp="1" noRot="1" noChangeAspect="1"/>
-          </p:cNvSpPr>
-          <p:nvPr>
-            <p:ph type="sldImg"/>
-          </p:nvPr>
-        </p:nvSpPr>
-        <p:spPr/>
-      </p:sp>
-      <p:sp>
-        <p:nvSpPr>
-          <p:cNvPr id="3" name="备注占位符 2"/>
-          <p:cNvSpPr>
-            <a:spLocks noGrp="1"/>
-          </p:cNvSpPr>
-          <p:nvPr>
-            <p:ph type="body" idx="1"/>
-          </p:nvPr>
-        </p:nvSpPr>
-        <p:spPr/>
-        <p:txBody>
-          <a:bodyPr/>
-          <a:lstStyle/>
-          <a:p>
             <a:pPr marL="171450" indent="-171450">
               <a:buFontTx/>
               <a:buChar char="-"/>
@@ -1433,7 +1352,7 @@
           <a:p>
             <a:fld id="{7DE8CF1B-47E4-456A-92EC-EAEB81C89AE6}" type="slidenum">
               <a:rPr lang="en-CA" smtClean="0"/>
-              <a:t>22</a:t>
+              <a:t>21</a:t>
             </a:fld>
             <a:endParaRPr lang="en-CA"/>
           </a:p>
@@ -7111,8 +7030,8 @@
         </p:blipFill>
         <p:spPr>
           <a:xfrm>
-            <a:off x="113850" y="484742"/>
-            <a:ext cx="11948249" cy="5111827"/>
+            <a:off x="356372" y="0"/>
+            <a:ext cx="11365021" cy="6180463"/>
           </a:xfrm>
           <a:prstGeom prst="rect">
             <a:avLst/>
@@ -7122,7 +7041,7 @@
     </p:spTree>
     <p:extLst>
       <p:ext uri="{BB962C8B-B14F-4D97-AF65-F5344CB8AC3E}">
-        <p14:creationId xmlns:p14="http://schemas.microsoft.com/office/powerpoint/2010/main" val="2723826869"/>
+        <p14:creationId xmlns:p14="http://schemas.microsoft.com/office/powerpoint/2010/main" val="328298744"/>
       </p:ext>
     </p:extLst>
   </p:cSld>
@@ -7167,8 +7086,8 @@
         </p:blipFill>
         <p:spPr>
           <a:xfrm>
-            <a:off x="356372" y="0"/>
-            <a:ext cx="11365021" cy="6180463"/>
+            <a:off x="446848" y="0"/>
+            <a:ext cx="11319166" cy="6233744"/>
           </a:xfrm>
           <a:prstGeom prst="rect">
             <a:avLst/>
@@ -7178,7 +7097,7 @@
     </p:spTree>
     <p:extLst>
       <p:ext uri="{BB962C8B-B14F-4D97-AF65-F5344CB8AC3E}">
-        <p14:creationId xmlns:p14="http://schemas.microsoft.com/office/powerpoint/2010/main" val="328298744"/>
+        <p14:creationId xmlns:p14="http://schemas.microsoft.com/office/powerpoint/2010/main" val="3717266372"/>
       </p:ext>
     </p:extLst>
   </p:cSld>
@@ -7205,36 +7124,97 @@
           <a:chExt cx="0" cy="0"/>
         </a:xfrm>
       </p:grpSpPr>
-      <p:pic>
-        <p:nvPicPr>
-          <p:cNvPr id="4" name="内容占位符 3"/>
-          <p:cNvPicPr>
-            <a:picLocks noGrp="1" noChangeAspect="1"/>
-          </p:cNvPicPr>
+      <p:sp>
+        <p:nvSpPr>
+          <p:cNvPr id="2" name="标题 1"/>
+          <p:cNvSpPr>
+            <a:spLocks noGrp="1"/>
+          </p:cNvSpPr>
+          <p:nvPr>
+            <p:ph type="title"/>
+          </p:nvPr>
+        </p:nvSpPr>
+        <p:spPr/>
+        <p:txBody>
+          <a:bodyPr/>
+          <a:lstStyle/>
+          <a:p>
+            <a:r>
+              <a:rPr lang="en-CA" dirty="0"/>
+              <a:t>Conclusion</a:t>
+            </a:r>
+          </a:p>
+        </p:txBody>
+      </p:sp>
+      <p:sp>
+        <p:nvSpPr>
+          <p:cNvPr id="3" name="内容占位符 2"/>
+          <p:cNvSpPr>
+            <a:spLocks noGrp="1"/>
+          </p:cNvSpPr>
           <p:nvPr>
             <p:ph idx="1"/>
           </p:nvPr>
-        </p:nvPicPr>
-        <p:blipFill>
-          <a:blip r:embed="rId3"/>
-          <a:stretch>
-            <a:fillRect/>
-          </a:stretch>
-        </p:blipFill>
-        <p:spPr>
-          <a:xfrm>
-            <a:off x="446848" y="0"/>
-            <a:ext cx="11319166" cy="6233744"/>
-          </a:xfrm>
-          <a:prstGeom prst="rect">
-            <a:avLst/>
-          </a:prstGeom>
-        </p:spPr>
-      </p:pic>
+        </p:nvSpPr>
+        <p:spPr/>
+        <p:txBody>
+          <a:bodyPr vert="horz" lIns="0" tIns="45720" rIns="0" bIns="45720" rtlCol="0" anchor="t">
+            <a:normAutofit/>
+          </a:bodyPr>
+          <a:lstStyle/>
+          <a:p>
+            <a:pPr>
+              <a:buFont typeface="Wingdings" panose="05000000000000000000" pitchFamily="2" charset="2"/>
+              <a:buChar char="Ø"/>
+            </a:pPr>
+            <a:r>
+              <a:rPr lang="en-CA" dirty="0"/>
+              <a:t> Which method is better?</a:t>
+            </a:r>
+            <a:endParaRPr lang="en-US" dirty="0"/>
+          </a:p>
+          <a:p>
+            <a:pPr marL="383540" lvl="1">
+              <a:buFont typeface="Wingdings" panose="05000000000000000000" pitchFamily="2" charset="2"/>
+              <a:buChar char="Ø"/>
+            </a:pPr>
+            <a:r>
+              <a:rPr lang="en-CA" dirty="0">
+                <a:cs typeface="Calibri"/>
+              </a:rPr>
+              <a:t>We tested the APSE of the three models with 5-fold CV</a:t>
+            </a:r>
+          </a:p>
+          <a:p>
+            <a:pPr marL="383540" lvl="1">
+              <a:buFont typeface="Wingdings" panose="05000000000000000000" pitchFamily="2" charset="2"/>
+              <a:buChar char="Ø"/>
+            </a:pPr>
+            <a:r>
+              <a:rPr lang="en-CA" dirty="0">
+                <a:cs typeface="Calibri"/>
+              </a:rPr>
+              <a:t>GAM with thin plate splines had the lowest APSE of 0.96</a:t>
+            </a:r>
+          </a:p>
+          <a:p>
+            <a:pPr marL="383540" lvl="1">
+              <a:buFont typeface="Wingdings" panose="05000000000000000000" pitchFamily="2" charset="2"/>
+              <a:buChar char="Ø"/>
+            </a:pPr>
+            <a:r>
+              <a:rPr lang="en-CA" dirty="0">
+                <a:cs typeface="Calibri"/>
+              </a:rPr>
+              <a:t> Splines was also the fastest to compute out of the three</a:t>
+            </a:r>
+          </a:p>
+        </p:txBody>
+      </p:sp>
     </p:spTree>
     <p:extLst>
       <p:ext uri="{BB962C8B-B14F-4D97-AF65-F5344CB8AC3E}">
-        <p14:creationId xmlns:p14="http://schemas.microsoft.com/office/powerpoint/2010/main" val="3717266372"/>
+        <p14:creationId xmlns:p14="http://schemas.microsoft.com/office/powerpoint/2010/main" val="666862570"/>
       </p:ext>
     </p:extLst>
   </p:cSld>
@@ -7278,7 +7258,7 @@
           <a:p>
             <a:r>
               <a:rPr lang="en-CA" dirty="0"/>
-              <a:t>Conclusion</a:t>
+              <a:t>Conclusion (cont.)</a:t>
             </a:r>
           </a:p>
         </p:txBody>
@@ -7305,10 +7285,23 @@
               <a:buChar char="Ø"/>
             </a:pPr>
             <a:r>
-              <a:rPr lang="en-CA" dirty="0"/>
-              <a:t> Which method is better?</a:t>
-            </a:r>
-            <a:endParaRPr lang="en-US" dirty="0"/>
+              <a:rPr lang="en-CA" dirty="0">
+                <a:cs typeface="Calibri"/>
+              </a:rPr>
+              <a:t> There are very significant factors( e.g. age ) what are outside of players control</a:t>
+            </a:r>
+          </a:p>
+          <a:p>
+            <a:pPr>
+              <a:buFont typeface="Wingdings" panose="05000000000000000000" pitchFamily="2" charset="2"/>
+              <a:buChar char="Ø"/>
+            </a:pPr>
+            <a:r>
+              <a:rPr lang="en-CA" dirty="0">
+                <a:cs typeface="Calibri"/>
+              </a:rPr>
+              <a:t> Three most important aspect to work on includes</a:t>
+            </a:r>
           </a:p>
           <a:p>
             <a:pPr marL="383540" lvl="1">
@@ -7319,7 +7312,7 @@
               <a:rPr lang="en-CA" dirty="0">
                 <a:cs typeface="Calibri"/>
               </a:rPr>
-              <a:t>We tested the APSE of the three models with 5-fold CV</a:t>
+              <a:t>  Increasing Field Goals</a:t>
             </a:r>
           </a:p>
           <a:p>
@@ -7331,7 +7324,7 @@
               <a:rPr lang="en-CA" dirty="0">
                 <a:cs typeface="Calibri"/>
               </a:rPr>
-              <a:t>GAM with thin plate splines had the lowest APSE of 0.96</a:t>
+              <a:t> Reducing Turnovers</a:t>
             </a:r>
           </a:p>
           <a:p>
@@ -7343,15 +7336,41 @@
               <a:rPr lang="en-CA" dirty="0">
                 <a:cs typeface="Calibri"/>
               </a:rPr>
-              <a:t> Splines was also the fastest to compute out of the three</a:t>
-            </a:r>
+              <a:t> Increasing Rebound</a:t>
+            </a:r>
+          </a:p>
+          <a:p>
+            <a:pPr marL="383540" lvl="1">
+              <a:buFont typeface="Wingdings" panose="05000000000000000000" pitchFamily="2" charset="2"/>
+              <a:buChar char="Ø"/>
+            </a:pPr>
+            <a:endParaRPr lang="en-CA" dirty="0">
+              <a:cs typeface="Calibri"/>
+            </a:endParaRPr>
+          </a:p>
+          <a:p>
+            <a:pPr marL="383540" lvl="1">
+              <a:buFont typeface="Wingdings" panose="05000000000000000000" pitchFamily="2" charset="2"/>
+              <a:buChar char="Ø"/>
+            </a:pPr>
+            <a:endParaRPr lang="en-CA" dirty="0">
+              <a:cs typeface="Calibri"/>
+            </a:endParaRPr>
+          </a:p>
+          <a:p>
+            <a:pPr marL="200660" lvl="1" indent="0">
+              <a:buNone/>
+            </a:pPr>
+            <a:endParaRPr lang="en-CA" dirty="0">
+              <a:cs typeface="Calibri"/>
+            </a:endParaRPr>
           </a:p>
         </p:txBody>
       </p:sp>
     </p:spTree>
     <p:extLst>
       <p:ext uri="{BB962C8B-B14F-4D97-AF65-F5344CB8AC3E}">
-        <p14:creationId xmlns:p14="http://schemas.microsoft.com/office/powerpoint/2010/main" val="666862570"/>
+        <p14:creationId xmlns:p14="http://schemas.microsoft.com/office/powerpoint/2010/main" val="1539948905"/>
       </p:ext>
     </p:extLst>
   </p:cSld>
@@ -7395,162 +7414,6 @@
           <a:p>
             <a:r>
               <a:rPr lang="en-CA" dirty="0"/>
-              <a:t>Conclusion (cont.)</a:t>
-            </a:r>
-          </a:p>
-        </p:txBody>
-      </p:sp>
-      <p:sp>
-        <p:nvSpPr>
-          <p:cNvPr id="3" name="内容占位符 2"/>
-          <p:cNvSpPr>
-            <a:spLocks noGrp="1"/>
-          </p:cNvSpPr>
-          <p:nvPr>
-            <p:ph idx="1"/>
-          </p:nvPr>
-        </p:nvSpPr>
-        <p:spPr/>
-        <p:txBody>
-          <a:bodyPr vert="horz" lIns="0" tIns="45720" rIns="0" bIns="45720" rtlCol="0" anchor="t">
-            <a:normAutofit/>
-          </a:bodyPr>
-          <a:lstStyle/>
-          <a:p>
-            <a:pPr>
-              <a:buFont typeface="Wingdings" panose="05000000000000000000" pitchFamily="2" charset="2"/>
-              <a:buChar char="Ø"/>
-            </a:pPr>
-            <a:r>
-              <a:rPr lang="en-CA" dirty="0">
-                <a:cs typeface="Calibri"/>
-              </a:rPr>
-              <a:t> There are very significant factors( e.g. age ) what are outside of players control</a:t>
-            </a:r>
-          </a:p>
-          <a:p>
-            <a:pPr>
-              <a:buFont typeface="Wingdings" panose="05000000000000000000" pitchFamily="2" charset="2"/>
-              <a:buChar char="Ø"/>
-            </a:pPr>
-            <a:r>
-              <a:rPr lang="en-CA" dirty="0">
-                <a:cs typeface="Calibri"/>
-              </a:rPr>
-              <a:t> Three most important aspect to work on includes</a:t>
-            </a:r>
-          </a:p>
-          <a:p>
-            <a:pPr marL="383540" lvl="1">
-              <a:buFont typeface="Wingdings" panose="05000000000000000000" pitchFamily="2" charset="2"/>
-              <a:buChar char="Ø"/>
-            </a:pPr>
-            <a:r>
-              <a:rPr lang="en-CA" dirty="0">
-                <a:cs typeface="Calibri"/>
-              </a:rPr>
-              <a:t>  Increasing Field Goals</a:t>
-            </a:r>
-          </a:p>
-          <a:p>
-            <a:pPr marL="383540" lvl="1">
-              <a:buFont typeface="Wingdings" panose="05000000000000000000" pitchFamily="2" charset="2"/>
-              <a:buChar char="Ø"/>
-            </a:pPr>
-            <a:r>
-              <a:rPr lang="en-CA" dirty="0">
-                <a:cs typeface="Calibri"/>
-              </a:rPr>
-              <a:t> Reducing Turnovers</a:t>
-            </a:r>
-          </a:p>
-          <a:p>
-            <a:pPr marL="383540" lvl="1">
-              <a:buFont typeface="Wingdings" panose="05000000000000000000" pitchFamily="2" charset="2"/>
-              <a:buChar char="Ø"/>
-            </a:pPr>
-            <a:r>
-              <a:rPr lang="en-CA" dirty="0">
-                <a:cs typeface="Calibri"/>
-              </a:rPr>
-              <a:t> Increasing Rebound</a:t>
-            </a:r>
-          </a:p>
-          <a:p>
-            <a:pPr marL="383540" lvl="1">
-              <a:buFont typeface="Wingdings" panose="05000000000000000000" pitchFamily="2" charset="2"/>
-              <a:buChar char="Ø"/>
-            </a:pPr>
-            <a:endParaRPr lang="en-CA" dirty="0">
-              <a:cs typeface="Calibri"/>
-            </a:endParaRPr>
-          </a:p>
-          <a:p>
-            <a:pPr marL="383540" lvl="1">
-              <a:buFont typeface="Wingdings" panose="05000000000000000000" pitchFamily="2" charset="2"/>
-              <a:buChar char="Ø"/>
-            </a:pPr>
-            <a:endParaRPr lang="en-CA" dirty="0">
-              <a:cs typeface="Calibri"/>
-            </a:endParaRPr>
-          </a:p>
-          <a:p>
-            <a:pPr marL="200660" lvl="1" indent="0">
-              <a:buNone/>
-            </a:pPr>
-            <a:endParaRPr lang="en-CA" dirty="0">
-              <a:cs typeface="Calibri"/>
-            </a:endParaRPr>
-          </a:p>
-        </p:txBody>
-      </p:sp>
-    </p:spTree>
-    <p:extLst>
-      <p:ext uri="{BB962C8B-B14F-4D97-AF65-F5344CB8AC3E}">
-        <p14:creationId xmlns:p14="http://schemas.microsoft.com/office/powerpoint/2010/main" val="1539948905"/>
-      </p:ext>
-    </p:extLst>
-  </p:cSld>
-  <p:clrMapOvr>
-    <a:masterClrMapping/>
-  </p:clrMapOvr>
-</p:sld>
-</file>
-
-<file path=ppt/slides/slide25.xml><?xml version="1.0" encoding="utf-8"?>
-<p:sld xmlns:a="http://schemas.openxmlformats.org/drawingml/2006/main" xmlns:r="http://schemas.openxmlformats.org/officeDocument/2006/relationships" xmlns:p="http://schemas.openxmlformats.org/presentationml/2006/main">
-  <p:cSld>
-    <p:spTree>
-      <p:nvGrpSpPr>
-        <p:cNvPr id="1" name=""/>
-        <p:cNvGrpSpPr/>
-        <p:nvPr/>
-      </p:nvGrpSpPr>
-      <p:grpSpPr>
-        <a:xfrm>
-          <a:off x="0" y="0"/>
-          <a:ext cx="0" cy="0"/>
-          <a:chOff x="0" y="0"/>
-          <a:chExt cx="0" cy="0"/>
-        </a:xfrm>
-      </p:grpSpPr>
-      <p:sp>
-        <p:nvSpPr>
-          <p:cNvPr id="2" name="标题 1"/>
-          <p:cNvSpPr>
-            <a:spLocks noGrp="1"/>
-          </p:cNvSpPr>
-          <p:nvPr>
-            <p:ph type="title"/>
-          </p:nvPr>
-        </p:nvSpPr>
-        <p:spPr/>
-        <p:txBody>
-          <a:bodyPr/>
-          <a:lstStyle/>
-          <a:p>
-            <a:r>
-              <a:rPr lang="en-CA" dirty="0"/>
               <a:t>Future Work</a:t>
             </a:r>
           </a:p>
@@ -7626,7 +7489,7 @@
 </p:sld>
 </file>
 
-<file path=ppt/slides/slide26.xml><?xml version="1.0" encoding="utf-8"?>
+<file path=ppt/slides/slide25.xml><?xml version="1.0" encoding="utf-8"?>
 <p:sld xmlns:a="http://schemas.openxmlformats.org/drawingml/2006/main" xmlns:r="http://schemas.openxmlformats.org/officeDocument/2006/relationships" xmlns:p="http://schemas.openxmlformats.org/presentationml/2006/main">
   <p:cSld>
     <p:spTree>

</xml_diff>